<commit_message>
bổ sung case study
</commit_message>
<xml_diff>
--- a/Case Study/Báo cáo Case study.pptx
+++ b/Case Study/Báo cáo Case study.pptx
@@ -201,7 +201,7 @@
           <a:p>
             <a:fld id="{0B31CA2E-4DD1-41EF-93C7-99DC6CDA5692}" type="datetimeFigureOut">
               <a:rPr lang="en-US" smtClean="0"/>
-              <a:t>9/18/22</a:t>
+              <a:t>9/21/22</a:t>
             </a:fld>
             <a:endParaRPr lang="en-US"/>
           </a:p>
@@ -597,7 +597,7 @@
           <a:p>
             <a:fld id="{C015ED42-B920-435F-B83B-C61666D3F108}" type="datetimeFigureOut">
               <a:rPr lang="en-US" smtClean="0"/>
-              <a:t>9/18/22</a:t>
+              <a:t>9/21/22</a:t>
             </a:fld>
             <a:endParaRPr lang="en-US"/>
           </a:p>
@@ -765,7 +765,7 @@
           <a:p>
             <a:fld id="{C015ED42-B920-435F-B83B-C61666D3F108}" type="datetimeFigureOut">
               <a:rPr lang="en-US" smtClean="0"/>
-              <a:t>9/18/22</a:t>
+              <a:t>9/21/22</a:t>
             </a:fld>
             <a:endParaRPr lang="en-US"/>
           </a:p>
@@ -943,7 +943,7 @@
           <a:p>
             <a:fld id="{C015ED42-B920-435F-B83B-C61666D3F108}" type="datetimeFigureOut">
               <a:rPr lang="en-US" smtClean="0"/>
-              <a:t>9/18/22</a:t>
+              <a:t>9/21/22</a:t>
             </a:fld>
             <a:endParaRPr lang="en-US"/>
           </a:p>
@@ -1111,7 +1111,7 @@
           <a:p>
             <a:fld id="{C015ED42-B920-435F-B83B-C61666D3F108}" type="datetimeFigureOut">
               <a:rPr lang="en-US" smtClean="0"/>
-              <a:t>9/18/22</a:t>
+              <a:t>9/21/22</a:t>
             </a:fld>
             <a:endParaRPr lang="en-US"/>
           </a:p>
@@ -1356,7 +1356,7 @@
           <a:p>
             <a:fld id="{C015ED42-B920-435F-B83B-C61666D3F108}" type="datetimeFigureOut">
               <a:rPr lang="en-US" smtClean="0"/>
-              <a:t>9/18/22</a:t>
+              <a:t>9/21/22</a:t>
             </a:fld>
             <a:endParaRPr lang="en-US"/>
           </a:p>
@@ -1585,7 +1585,7 @@
           <a:p>
             <a:fld id="{C015ED42-B920-435F-B83B-C61666D3F108}" type="datetimeFigureOut">
               <a:rPr lang="en-US" smtClean="0"/>
-              <a:t>9/18/22</a:t>
+              <a:t>9/21/22</a:t>
             </a:fld>
             <a:endParaRPr lang="en-US"/>
           </a:p>
@@ -1949,7 +1949,7 @@
           <a:p>
             <a:fld id="{C015ED42-B920-435F-B83B-C61666D3F108}" type="datetimeFigureOut">
               <a:rPr lang="en-US" smtClean="0"/>
-              <a:t>9/18/22</a:t>
+              <a:t>9/21/22</a:t>
             </a:fld>
             <a:endParaRPr lang="en-US"/>
           </a:p>
@@ -2066,7 +2066,7 @@
           <a:p>
             <a:fld id="{C015ED42-B920-435F-B83B-C61666D3F108}" type="datetimeFigureOut">
               <a:rPr lang="en-US" smtClean="0"/>
-              <a:t>9/18/22</a:t>
+              <a:t>9/21/22</a:t>
             </a:fld>
             <a:endParaRPr lang="en-US"/>
           </a:p>
@@ -2161,7 +2161,7 @@
           <a:p>
             <a:fld id="{C015ED42-B920-435F-B83B-C61666D3F108}" type="datetimeFigureOut">
               <a:rPr lang="en-US" smtClean="0"/>
-              <a:t>9/18/22</a:t>
+              <a:t>9/21/22</a:t>
             </a:fld>
             <a:endParaRPr lang="en-US"/>
           </a:p>
@@ -2436,7 +2436,7 @@
           <a:p>
             <a:fld id="{C015ED42-B920-435F-B83B-C61666D3F108}" type="datetimeFigureOut">
               <a:rPr lang="en-US" smtClean="0"/>
-              <a:t>9/18/22</a:t>
+              <a:t>9/21/22</a:t>
             </a:fld>
             <a:endParaRPr lang="en-US"/>
           </a:p>
@@ -2688,7 +2688,7 @@
           <a:p>
             <a:fld id="{C015ED42-B920-435F-B83B-C61666D3F108}" type="datetimeFigureOut">
               <a:rPr lang="en-US" smtClean="0"/>
-              <a:t>9/18/22</a:t>
+              <a:t>9/21/22</a:t>
             </a:fld>
             <a:endParaRPr lang="en-US"/>
           </a:p>
@@ -2899,7 +2899,7 @@
           <a:p>
             <a:fld id="{C015ED42-B920-435F-B83B-C61666D3F108}" type="datetimeFigureOut">
               <a:rPr lang="en-US" smtClean="0"/>
-              <a:t>9/18/22</a:t>
+              <a:t>9/21/22</a:t>
             </a:fld>
             <a:endParaRPr lang="en-US"/>
           </a:p>
@@ -10190,268 +10190,6 @@
               <a:t> tin</a:t>
             </a:r>
           </a:p>
-          <a:p>
-            <a:pPr algn="l"/>
-            <a:r>
-              <a:rPr lang="en-US" sz="2000" dirty="0">
-                <a:latin typeface="Times New Roman" panose="02020603050405020304" pitchFamily="18" charset="0"/>
-                <a:cs typeface="Times New Roman" panose="02020603050405020304" pitchFamily="18" charset="0"/>
-              </a:rPr>
-              <a:t>・</a:t>
-            </a:r>
-            <a:r>
-              <a:rPr lang="en-US" sz="2000" dirty="0" err="1">
-                <a:latin typeface="Times New Roman" panose="02020603050405020304" pitchFamily="18" charset="0"/>
-                <a:cs typeface="Times New Roman" panose="02020603050405020304" pitchFamily="18" charset="0"/>
-              </a:rPr>
-              <a:t>Các</a:t>
-            </a:r>
-            <a:r>
-              <a:rPr lang="en-US" sz="2000" dirty="0">
-                <a:latin typeface="Times New Roman" panose="02020603050405020304" pitchFamily="18" charset="0"/>
-                <a:cs typeface="Times New Roman" panose="02020603050405020304" pitchFamily="18" charset="0"/>
-              </a:rPr>
-              <a:t> </a:t>
-            </a:r>
-            <a:r>
-              <a:rPr lang="en-US" sz="2000" dirty="0" err="1">
-                <a:latin typeface="Times New Roman" panose="02020603050405020304" pitchFamily="18" charset="0"/>
-                <a:cs typeface="Times New Roman" panose="02020603050405020304" pitchFamily="18" charset="0"/>
-              </a:rPr>
-              <a:t>thông</a:t>
-            </a:r>
-            <a:r>
-              <a:rPr lang="en-US" sz="2000" dirty="0">
-                <a:latin typeface="Times New Roman" panose="02020603050405020304" pitchFamily="18" charset="0"/>
-                <a:cs typeface="Times New Roman" panose="02020603050405020304" pitchFamily="18" charset="0"/>
-              </a:rPr>
-              <a:t> tin </a:t>
-            </a:r>
-            <a:r>
-              <a:rPr lang="en-US" sz="2000" dirty="0" err="1">
-                <a:latin typeface="Times New Roman" panose="02020603050405020304" pitchFamily="18" charset="0"/>
-                <a:cs typeface="Times New Roman" panose="02020603050405020304" pitchFamily="18" charset="0"/>
-              </a:rPr>
-              <a:t>đa</a:t>
-            </a:r>
-            <a:r>
-              <a:rPr lang="en-US" sz="2000" dirty="0">
-                <a:latin typeface="Times New Roman" panose="02020603050405020304" pitchFamily="18" charset="0"/>
-                <a:cs typeface="Times New Roman" panose="02020603050405020304" pitchFamily="18" charset="0"/>
-              </a:rPr>
-              <a:t> </a:t>
-            </a:r>
-            <a:r>
-              <a:rPr lang="en-US" sz="2000" dirty="0" err="1">
-                <a:latin typeface="Times New Roman" panose="02020603050405020304" pitchFamily="18" charset="0"/>
-                <a:cs typeface="Times New Roman" panose="02020603050405020304" pitchFamily="18" charset="0"/>
-              </a:rPr>
-              <a:t>phần</a:t>
-            </a:r>
-            <a:r>
-              <a:rPr lang="en-US" sz="2000" dirty="0">
-                <a:latin typeface="Times New Roman" panose="02020603050405020304" pitchFamily="18" charset="0"/>
-                <a:cs typeface="Times New Roman" panose="02020603050405020304" pitchFamily="18" charset="0"/>
-              </a:rPr>
-              <a:t> </a:t>
-            </a:r>
-            <a:r>
-              <a:rPr lang="en-US" sz="2000" dirty="0" err="1">
-                <a:latin typeface="Times New Roman" panose="02020603050405020304" pitchFamily="18" charset="0"/>
-                <a:cs typeface="Times New Roman" panose="02020603050405020304" pitchFamily="18" charset="0"/>
-              </a:rPr>
-              <a:t>là</a:t>
-            </a:r>
-            <a:r>
-              <a:rPr lang="en-US" sz="2000" dirty="0">
-                <a:latin typeface="Times New Roman" panose="02020603050405020304" pitchFamily="18" charset="0"/>
-                <a:cs typeface="Times New Roman" panose="02020603050405020304" pitchFamily="18" charset="0"/>
-              </a:rPr>
-              <a:t> </a:t>
-            </a:r>
-            <a:r>
-              <a:rPr lang="en-US" sz="2000" dirty="0" err="1">
-                <a:latin typeface="Times New Roman" panose="02020603050405020304" pitchFamily="18" charset="0"/>
-                <a:cs typeface="Times New Roman" panose="02020603050405020304" pitchFamily="18" charset="0"/>
-              </a:rPr>
-              <a:t>tiếng</a:t>
-            </a:r>
-            <a:r>
-              <a:rPr lang="en-US" sz="2000" dirty="0">
-                <a:latin typeface="Times New Roman" panose="02020603050405020304" pitchFamily="18" charset="0"/>
-                <a:cs typeface="Times New Roman" panose="02020603050405020304" pitchFamily="18" charset="0"/>
-              </a:rPr>
-              <a:t> Anh, </a:t>
-            </a:r>
-            <a:r>
-              <a:rPr lang="en-US" sz="2000" dirty="0" err="1">
-                <a:latin typeface="Times New Roman" panose="02020603050405020304" pitchFamily="18" charset="0"/>
-                <a:cs typeface="Times New Roman" panose="02020603050405020304" pitchFamily="18" charset="0"/>
-              </a:rPr>
-              <a:t>đối</a:t>
-            </a:r>
-            <a:r>
-              <a:rPr lang="en-US" sz="2000" dirty="0">
-                <a:latin typeface="Times New Roman" panose="02020603050405020304" pitchFamily="18" charset="0"/>
-                <a:cs typeface="Times New Roman" panose="02020603050405020304" pitchFamily="18" charset="0"/>
-              </a:rPr>
-              <a:t> </a:t>
-            </a:r>
-            <a:r>
-              <a:rPr lang="en-US" sz="2000" dirty="0" err="1">
-                <a:latin typeface="Times New Roman" panose="02020603050405020304" pitchFamily="18" charset="0"/>
-                <a:cs typeface="Times New Roman" panose="02020603050405020304" pitchFamily="18" charset="0"/>
-              </a:rPr>
-              <a:t>với</a:t>
-            </a:r>
-            <a:r>
-              <a:rPr lang="en-US" sz="2000" dirty="0">
-                <a:latin typeface="Times New Roman" panose="02020603050405020304" pitchFamily="18" charset="0"/>
-                <a:cs typeface="Times New Roman" panose="02020603050405020304" pitchFamily="18" charset="0"/>
-              </a:rPr>
-              <a:t> </a:t>
-            </a:r>
-            <a:r>
-              <a:rPr lang="en-US" sz="2000" dirty="0" err="1">
-                <a:latin typeface="Times New Roman" panose="02020603050405020304" pitchFamily="18" charset="0"/>
-                <a:cs typeface="Times New Roman" panose="02020603050405020304" pitchFamily="18" charset="0"/>
-              </a:rPr>
-              <a:t>các</a:t>
-            </a:r>
-            <a:r>
-              <a:rPr lang="en-US" sz="2000" dirty="0">
-                <a:latin typeface="Times New Roman" panose="02020603050405020304" pitchFamily="18" charset="0"/>
-                <a:cs typeface="Times New Roman" panose="02020603050405020304" pitchFamily="18" charset="0"/>
-              </a:rPr>
-              <a:t> </a:t>
-            </a:r>
-            <a:r>
-              <a:rPr lang="en-US" sz="2000" dirty="0" err="1">
-                <a:latin typeface="Times New Roman" panose="02020603050405020304" pitchFamily="18" charset="0"/>
-                <a:cs typeface="Times New Roman" panose="02020603050405020304" pitchFamily="18" charset="0"/>
-              </a:rPr>
-              <a:t>bạn</a:t>
-            </a:r>
-            <a:r>
-              <a:rPr lang="en-US" sz="2000" dirty="0">
-                <a:latin typeface="Times New Roman" panose="02020603050405020304" pitchFamily="18" charset="0"/>
-                <a:cs typeface="Times New Roman" panose="02020603050405020304" pitchFamily="18" charset="0"/>
-              </a:rPr>
-              <a:t> </a:t>
-            </a:r>
-            <a:r>
-              <a:rPr lang="en-US" sz="2000" dirty="0" err="1">
-                <a:latin typeface="Times New Roman" panose="02020603050405020304" pitchFamily="18" charset="0"/>
-                <a:cs typeface="Times New Roman" panose="02020603050405020304" pitchFamily="18" charset="0"/>
-              </a:rPr>
-              <a:t>có</a:t>
-            </a:r>
-            <a:r>
-              <a:rPr lang="en-US" sz="2000" dirty="0">
-                <a:latin typeface="Times New Roman" panose="02020603050405020304" pitchFamily="18" charset="0"/>
-                <a:cs typeface="Times New Roman" panose="02020603050405020304" pitchFamily="18" charset="0"/>
-              </a:rPr>
-              <a:t> </a:t>
-            </a:r>
-            <a:r>
-              <a:rPr lang="en-US" sz="2000" dirty="0" err="1">
-                <a:latin typeface="Times New Roman" panose="02020603050405020304" pitchFamily="18" charset="0"/>
-                <a:cs typeface="Times New Roman" panose="02020603050405020304" pitchFamily="18" charset="0"/>
-              </a:rPr>
-              <a:t>tiếng</a:t>
-            </a:r>
-            <a:r>
-              <a:rPr lang="en-US" sz="2000" dirty="0">
-                <a:latin typeface="Times New Roman" panose="02020603050405020304" pitchFamily="18" charset="0"/>
-                <a:cs typeface="Times New Roman" panose="02020603050405020304" pitchFamily="18" charset="0"/>
-              </a:rPr>
-              <a:t> Anh </a:t>
-            </a:r>
-            <a:r>
-              <a:rPr lang="en-US" sz="2000" dirty="0" err="1">
-                <a:latin typeface="Times New Roman" panose="02020603050405020304" pitchFamily="18" charset="0"/>
-                <a:cs typeface="Times New Roman" panose="02020603050405020304" pitchFamily="18" charset="0"/>
-              </a:rPr>
-              <a:t>không</a:t>
-            </a:r>
-            <a:r>
-              <a:rPr lang="en-US" sz="2000" dirty="0">
-                <a:latin typeface="Times New Roman" panose="02020603050405020304" pitchFamily="18" charset="0"/>
-                <a:cs typeface="Times New Roman" panose="02020603050405020304" pitchFamily="18" charset="0"/>
-              </a:rPr>
-              <a:t> </a:t>
-            </a:r>
-            <a:r>
-              <a:rPr lang="en-US" sz="2000" dirty="0" err="1">
-                <a:latin typeface="Times New Roman" panose="02020603050405020304" pitchFamily="18" charset="0"/>
-                <a:cs typeface="Times New Roman" panose="02020603050405020304" pitchFamily="18" charset="0"/>
-              </a:rPr>
-              <a:t>tốt</a:t>
-            </a:r>
-            <a:r>
-              <a:rPr lang="en-US" sz="2000" dirty="0">
-                <a:latin typeface="Times New Roman" panose="02020603050405020304" pitchFamily="18" charset="0"/>
-                <a:cs typeface="Times New Roman" panose="02020603050405020304" pitchFamily="18" charset="0"/>
-              </a:rPr>
-              <a:t> </a:t>
-            </a:r>
-            <a:r>
-              <a:rPr lang="en-US" sz="2000" dirty="0" err="1">
-                <a:latin typeface="Times New Roman" panose="02020603050405020304" pitchFamily="18" charset="0"/>
-                <a:cs typeface="Times New Roman" panose="02020603050405020304" pitchFamily="18" charset="0"/>
-              </a:rPr>
-              <a:t>thì</a:t>
-            </a:r>
-            <a:r>
-              <a:rPr lang="en-US" sz="2000" dirty="0">
-                <a:latin typeface="Times New Roman" panose="02020603050405020304" pitchFamily="18" charset="0"/>
-                <a:cs typeface="Times New Roman" panose="02020603050405020304" pitchFamily="18" charset="0"/>
-              </a:rPr>
-              <a:t> </a:t>
-            </a:r>
-            <a:r>
-              <a:rPr lang="en-US" sz="2000" dirty="0" err="1">
-                <a:latin typeface="Times New Roman" panose="02020603050405020304" pitchFamily="18" charset="0"/>
-                <a:cs typeface="Times New Roman" panose="02020603050405020304" pitchFamily="18" charset="0"/>
-              </a:rPr>
-              <a:t>rất</a:t>
-            </a:r>
-            <a:r>
-              <a:rPr lang="en-US" sz="2000" dirty="0">
-                <a:latin typeface="Times New Roman" panose="02020603050405020304" pitchFamily="18" charset="0"/>
-                <a:cs typeface="Times New Roman" panose="02020603050405020304" pitchFamily="18" charset="0"/>
-              </a:rPr>
-              <a:t> </a:t>
-            </a:r>
-            <a:r>
-              <a:rPr lang="en-US" sz="2000" dirty="0" err="1">
-                <a:latin typeface="Times New Roman" panose="02020603050405020304" pitchFamily="18" charset="0"/>
-                <a:cs typeface="Times New Roman" panose="02020603050405020304" pitchFamily="18" charset="0"/>
-              </a:rPr>
-              <a:t>khó</a:t>
-            </a:r>
-            <a:r>
-              <a:rPr lang="en-US" sz="2000" dirty="0">
-                <a:latin typeface="Times New Roman" panose="02020603050405020304" pitchFamily="18" charset="0"/>
-                <a:cs typeface="Times New Roman" panose="02020603050405020304" pitchFamily="18" charset="0"/>
-              </a:rPr>
-              <a:t> </a:t>
-            </a:r>
-            <a:r>
-              <a:rPr lang="en-US" sz="2000" dirty="0" err="1">
-                <a:latin typeface="Times New Roman" panose="02020603050405020304" pitchFamily="18" charset="0"/>
-                <a:cs typeface="Times New Roman" panose="02020603050405020304" pitchFamily="18" charset="0"/>
-              </a:rPr>
-              <a:t>khăn</a:t>
-            </a:r>
-            <a:r>
-              <a:rPr lang="en-US" sz="2000" dirty="0">
-                <a:latin typeface="Times New Roman" panose="02020603050405020304" pitchFamily="18" charset="0"/>
-                <a:cs typeface="Times New Roman" panose="02020603050405020304" pitchFamily="18" charset="0"/>
-              </a:rPr>
-              <a:t> </a:t>
-            </a:r>
-          </a:p>
         </p:txBody>
       </p:sp>
       <p:sp>
@@ -11058,7 +10796,7 @@
                 <a:latin typeface="Times New Roman" panose="02020603050405020304" pitchFamily="18" charset="0"/>
                 <a:cs typeface="Times New Roman" panose="02020603050405020304" pitchFamily="18" charset="0"/>
               </a:rPr>
-              <a:t>, preview.</a:t>
+              <a:t>, preview,…</a:t>
             </a:r>
           </a:p>
           <a:p>
@@ -11557,34 +11295,6 @@
                 <a:latin typeface="Times New Roman" panose="02020603050405020304" pitchFamily="18" charset="0"/>
                 <a:cs typeface="Times New Roman" panose="02020603050405020304" pitchFamily="18" charset="0"/>
               </a:rPr>
-              <a:t>tất</a:t>
-            </a:r>
-            <a:r>
-              <a:rPr lang="en-US" sz="2000" dirty="0">
-                <a:latin typeface="Times New Roman" panose="02020603050405020304" pitchFamily="18" charset="0"/>
-                <a:cs typeface="Times New Roman" panose="02020603050405020304" pitchFamily="18" charset="0"/>
-              </a:rPr>
-              <a:t> </a:t>
-            </a:r>
-            <a:r>
-              <a:rPr lang="en-US" sz="2000" dirty="0" err="1">
-                <a:latin typeface="Times New Roman" panose="02020603050405020304" pitchFamily="18" charset="0"/>
-                <a:cs typeface="Times New Roman" panose="02020603050405020304" pitchFamily="18" charset="0"/>
-              </a:rPr>
-              <a:t>cả</a:t>
-            </a:r>
-            <a:r>
-              <a:rPr lang="en-US" sz="2000" dirty="0">
-                <a:latin typeface="Times New Roman" panose="02020603050405020304" pitchFamily="18" charset="0"/>
-                <a:cs typeface="Times New Roman" panose="02020603050405020304" pitchFamily="18" charset="0"/>
-              </a:rPr>
-              <a:t> </a:t>
-            </a:r>
-            <a:r>
-              <a:rPr lang="en-US" sz="2000" dirty="0" err="1">
-                <a:latin typeface="Times New Roman" panose="02020603050405020304" pitchFamily="18" charset="0"/>
-                <a:cs typeface="Times New Roman" panose="02020603050405020304" pitchFamily="18" charset="0"/>
-              </a:rPr>
               <a:t>máy</a:t>
             </a:r>
             <a:r>
@@ -11601,10 +11311,55 @@
               </a:rPr>
               <a:t>tính</a:t>
             </a:r>
-            <a:endParaRPr lang="en-US" sz="2000" dirty="0">
-              <a:latin typeface="Times New Roman" panose="02020603050405020304" pitchFamily="18" charset="0"/>
-              <a:cs typeface="Times New Roman" panose="02020603050405020304" pitchFamily="18" charset="0"/>
-            </a:endParaRPr>
+            <a:r>
+              <a:rPr lang="en-US" sz="2000" dirty="0">
+                <a:latin typeface="Times New Roman" panose="02020603050405020304" pitchFamily="18" charset="0"/>
+                <a:cs typeface="Times New Roman" panose="02020603050405020304" pitchFamily="18" charset="0"/>
+              </a:rPr>
+              <a:t> </a:t>
+            </a:r>
+            <a:r>
+              <a:rPr lang="en-US" sz="2000" dirty="0" err="1">
+                <a:latin typeface="Times New Roman" panose="02020603050405020304" pitchFamily="18" charset="0"/>
+                <a:cs typeface="Times New Roman" panose="02020603050405020304" pitchFamily="18" charset="0"/>
+              </a:rPr>
+              <a:t>khác</a:t>
+            </a:r>
+            <a:r>
+              <a:rPr lang="en-US" sz="2000" dirty="0">
+                <a:latin typeface="Times New Roman" panose="02020603050405020304" pitchFamily="18" charset="0"/>
+                <a:cs typeface="Times New Roman" panose="02020603050405020304" pitchFamily="18" charset="0"/>
+              </a:rPr>
+              <a:t> </a:t>
+            </a:r>
+            <a:r>
+              <a:rPr lang="en-US" sz="2000" dirty="0" err="1">
+                <a:latin typeface="Times New Roman" panose="02020603050405020304" pitchFamily="18" charset="0"/>
+                <a:cs typeface="Times New Roman" panose="02020603050405020304" pitchFamily="18" charset="0"/>
+              </a:rPr>
+              <a:t>để</a:t>
+            </a:r>
+            <a:r>
+              <a:rPr lang="en-US" sz="2000" dirty="0">
+                <a:latin typeface="Times New Roman" panose="02020603050405020304" pitchFamily="18" charset="0"/>
+                <a:cs typeface="Times New Roman" panose="02020603050405020304" pitchFamily="18" charset="0"/>
+              </a:rPr>
+              <a:t> </a:t>
+            </a:r>
+            <a:r>
+              <a:rPr lang="en-US" sz="2000" dirty="0" err="1">
+                <a:latin typeface="Times New Roman" panose="02020603050405020304" pitchFamily="18" charset="0"/>
+                <a:cs typeface="Times New Roman" panose="02020603050405020304" pitchFamily="18" charset="0"/>
+              </a:rPr>
+              <a:t>sử</a:t>
+            </a:r>
+            <a:r>
+              <a:rPr lang="en-US" sz="2000" dirty="0">
+                <a:latin typeface="Times New Roman" panose="02020603050405020304" pitchFamily="18" charset="0"/>
+                <a:cs typeface="Times New Roman" panose="02020603050405020304" pitchFamily="18" charset="0"/>
+              </a:rPr>
+              <a:t> dung.</a:t>
+            </a:r>
           </a:p>
           <a:p>
             <a:pPr algn="l"/>

</xml_diff>